<commit_message>
Modified README.MD Added Dumps DB Modified struct DB scripts Added "livrable" archive
</commit_message>
<xml_diff>
--- a/presentation/Presentation.pptx
+++ b/presentation/Presentation.pptx
@@ -866,7 +866,7 @@
             <a:fld id="{B61BEF0D-F0BB-DE4B-95CE-6DB70DBA9567}" type="datetimeFigureOut">
               <a:rPr lang="en-US" dirty="0"/>
               <a:pPr/>
-              <a:t>9/17/2020</a:t>
+              <a:t>9/21/2020</a:t>
             </a:fld>
             <a:endParaRPr lang="en-US" dirty="0"/>
           </a:p>
@@ -1114,7 +1114,7 @@
             <a:fld id="{B61BEF0D-F0BB-DE4B-95CE-6DB70DBA9567}" type="datetimeFigureOut">
               <a:rPr lang="en-US" dirty="0"/>
               <a:pPr/>
-              <a:t>9/17/2020</a:t>
+              <a:t>9/21/2020</a:t>
             </a:fld>
             <a:endParaRPr lang="en-US" dirty="0"/>
           </a:p>
@@ -1425,7 +1425,7 @@
             <a:fld id="{B61BEF0D-F0BB-DE4B-95CE-6DB70DBA9567}" type="datetimeFigureOut">
               <a:rPr lang="en-US" dirty="0"/>
               <a:pPr/>
-              <a:t>9/17/2020</a:t>
+              <a:t>9/21/2020</a:t>
             </a:fld>
             <a:endParaRPr lang="en-US" dirty="0"/>
           </a:p>
@@ -1755,7 +1755,7 @@
             <a:fld id="{B61BEF0D-F0BB-DE4B-95CE-6DB70DBA9567}" type="datetimeFigureOut">
               <a:rPr lang="en-US" dirty="0"/>
               <a:pPr/>
-              <a:t>9/17/2020</a:t>
+              <a:t>9/21/2020</a:t>
             </a:fld>
             <a:endParaRPr lang="en-US" dirty="0"/>
           </a:p>
@@ -2066,7 +2066,7 @@
             <a:fld id="{B61BEF0D-F0BB-DE4B-95CE-6DB70DBA9567}" type="datetimeFigureOut">
               <a:rPr lang="en-US" dirty="0"/>
               <a:pPr/>
-              <a:t>9/17/2020</a:t>
+              <a:t>9/21/2020</a:t>
             </a:fld>
             <a:endParaRPr lang="en-US" dirty="0"/>
           </a:p>
@@ -2456,7 +2456,7 @@
             <a:fld id="{B61BEF0D-F0BB-DE4B-95CE-6DB70DBA9567}" type="datetimeFigureOut">
               <a:rPr lang="en-US" dirty="0"/>
               <a:pPr/>
-              <a:t>9/17/2020</a:t>
+              <a:t>9/21/2020</a:t>
             </a:fld>
             <a:endParaRPr lang="en-US" dirty="0"/>
           </a:p>
@@ -2622,7 +2622,7 @@
           <a:p>
             <a:fld id="{55C6B4A9-1611-4792-9094-5F34BCA07E0B}" type="datetimeFigureOut">
               <a:rPr lang="en-US" dirty="0"/>
-              <a:t>9/17/2020</a:t>
+              <a:t>9/21/2020</a:t>
             </a:fld>
             <a:endParaRPr lang="en-US" dirty="0"/>
           </a:p>
@@ -2798,7 +2798,7 @@
             <a:fld id="{B61BEF0D-F0BB-DE4B-95CE-6DB70DBA9567}" type="datetimeFigureOut">
               <a:rPr lang="en-US" dirty="0"/>
               <a:pPr/>
-              <a:t>9/17/2020</a:t>
+              <a:t>9/21/2020</a:t>
             </a:fld>
             <a:endParaRPr lang="en-US" dirty="0"/>
           </a:p>
@@ -2964,7 +2964,7 @@
           <a:p>
             <a:fld id="{42A54C80-263E-416B-A8E0-580EDEADCBDC}" type="datetimeFigureOut">
               <a:rPr lang="en-US" dirty="0"/>
-              <a:t>9/17/2020</a:t>
+              <a:t>9/21/2020</a:t>
             </a:fld>
             <a:endParaRPr lang="en-US" dirty="0"/>
           </a:p>
@@ -3207,7 +3207,7 @@
             <a:fld id="{B61BEF0D-F0BB-DE4B-95CE-6DB70DBA9567}" type="datetimeFigureOut">
               <a:rPr lang="en-US" dirty="0"/>
               <a:pPr/>
-              <a:t>9/17/2020</a:t>
+              <a:t>9/21/2020</a:t>
             </a:fld>
             <a:endParaRPr lang="en-US" dirty="0"/>
           </a:p>
@@ -3435,7 +3435,7 @@
           <a:p>
             <a:fld id="{42A54C80-263E-416B-A8E0-580EDEADCBDC}" type="datetimeFigureOut">
               <a:rPr lang="en-US" dirty="0"/>
-              <a:t>9/17/2020</a:t>
+              <a:t>9/21/2020</a:t>
             </a:fld>
             <a:endParaRPr lang="en-US" dirty="0"/>
           </a:p>
@@ -3805,7 +3805,7 @@
             <a:fld id="{B61BEF0D-F0BB-DE4B-95CE-6DB70DBA9567}" type="datetimeFigureOut">
               <a:rPr lang="en-US" dirty="0"/>
               <a:pPr/>
-              <a:t>9/17/2020</a:t>
+              <a:t>9/21/2020</a:t>
             </a:fld>
             <a:endParaRPr lang="en-US" dirty="0"/>
           </a:p>
@@ -3925,7 +3925,7 @@
             <a:fld id="{B61BEF0D-F0BB-DE4B-95CE-6DB70DBA9567}" type="datetimeFigureOut">
               <a:rPr lang="en-US" dirty="0"/>
               <a:pPr/>
-              <a:t>9/17/2020</a:t>
+              <a:t>9/21/2020</a:t>
             </a:fld>
             <a:endParaRPr lang="en-US" dirty="0"/>
           </a:p>
@@ -4017,7 +4017,7 @@
             <a:fld id="{B61BEF0D-F0BB-DE4B-95CE-6DB70DBA9567}" type="datetimeFigureOut">
               <a:rPr lang="en-US" dirty="0"/>
               <a:pPr/>
-              <a:t>9/17/2020</a:t>
+              <a:t>9/21/2020</a:t>
             </a:fld>
             <a:endParaRPr lang="en-US" dirty="0"/>
           </a:p>
@@ -4268,7 +4268,7 @@
           <a:p>
             <a:fld id="{42A54C80-263E-416B-A8E0-580EDEADCBDC}" type="datetimeFigureOut">
               <a:rPr lang="en-US" dirty="0"/>
-              <a:t>9/17/2020</a:t>
+              <a:t>9/21/2020</a:t>
             </a:fld>
             <a:endParaRPr lang="en-US" dirty="0"/>
           </a:p>
@@ -4570,7 +4570,7 @@
             <a:fld id="{B61BEF0D-F0BB-DE4B-95CE-6DB70DBA9567}" type="datetimeFigureOut">
               <a:rPr lang="en-US" dirty="0"/>
               <a:pPr/>
-              <a:t>9/17/2020</a:t>
+              <a:t>9/21/2020</a:t>
             </a:fld>
             <a:endParaRPr lang="en-US" dirty="0"/>
           </a:p>
@@ -5268,7 +5268,7 @@
             <a:fld id="{B61BEF0D-F0BB-DE4B-95CE-6DB70DBA9567}" type="datetimeFigureOut">
               <a:rPr lang="en-US" dirty="0"/>
               <a:pPr/>
-              <a:t>9/17/2020</a:t>
+              <a:t>9/21/2020</a:t>
             </a:fld>
             <a:endParaRPr lang="en-US" dirty="0"/>
           </a:p>
@@ -7740,7 +7740,7 @@
       </p:pic>
       <p:pic>
         <p:nvPicPr>
-          <p:cNvPr id="3" name="Image 2"/>
+          <p:cNvPr id="2" name="Image 1"/>
           <p:cNvPicPr>
             <a:picLocks noChangeAspect="1"/>
           </p:cNvPicPr>
@@ -7760,14 +7760,14 @@
         </p:blipFill>
         <p:spPr>
           <a:xfrm>
-            <a:off x="1746445" y="1545186"/>
-            <a:ext cx="6433279" cy="4976016"/>
+            <a:off x="1543115" y="1538302"/>
+            <a:ext cx="6865106" cy="4950928"/>
           </a:xfrm>
           <a:prstGeom prst="rect">
             <a:avLst/>
           </a:prstGeom>
           <a:effectLst>
-            <a:outerShdw blurRad="50800" dist="38100" dir="2700000" algn="tl" rotWithShape="0">
+            <a:outerShdw blurRad="50800" dist="76200" dir="2700000" algn="tl" rotWithShape="0">
               <a:prstClr val="black">
                 <a:alpha val="40000"/>
               </a:prstClr>

</xml_diff>